<commit_message>
ready i think for monday jan 27 meeting
</commit_message>
<xml_diff>
--- a/W210_EDA.pptx
+++ b/W210_EDA.pptx
@@ -5,34 +5,35 @@
     <p:sldMasterId id="2147483648" r:id="rId1"/>
   </p:sldMasterIdLst>
   <p:notesMasterIdLst>
-    <p:notesMasterId r:id="rId7"/>
+    <p:notesMasterId r:id="rId8"/>
   </p:notesMasterIdLst>
   <p:handoutMasterIdLst>
-    <p:handoutMasterId r:id="rId8"/>
+    <p:handoutMasterId r:id="rId9"/>
   </p:handoutMasterIdLst>
   <p:sldIdLst>
     <p:sldId id="256" r:id="rId2"/>
-    <p:sldId id="281" r:id="rId3"/>
-    <p:sldId id="283" r:id="rId4"/>
-    <p:sldId id="284" r:id="rId5"/>
-    <p:sldId id="285" r:id="rId6"/>
+    <p:sldId id="286" r:id="rId3"/>
+    <p:sldId id="281" r:id="rId4"/>
+    <p:sldId id="283" r:id="rId5"/>
+    <p:sldId id="284" r:id="rId6"/>
+    <p:sldId id="285" r:id="rId7"/>
   </p:sldIdLst>
   <p:sldSz cx="9144000" cy="6858000" type="screen4x3"/>
   <p:notesSz cx="6858000" cy="9144000"/>
   <p:embeddedFontLst>
     <p:embeddedFont>
       <p:font typeface="Calibri" panose="020F0502020204030204" pitchFamily="34" charset="0"/>
-      <p:regular r:id="rId9"/>
-      <p:bold r:id="rId10"/>
-      <p:italic r:id="rId11"/>
-      <p:boldItalic r:id="rId12"/>
+      <p:regular r:id="rId10"/>
+      <p:bold r:id="rId11"/>
+      <p:italic r:id="rId12"/>
+      <p:boldItalic r:id="rId13"/>
     </p:embeddedFont>
     <p:embeddedFont>
       <p:font typeface="Century Gothic" panose="020B0502020202020204" pitchFamily="34" charset="0"/>
-      <p:regular r:id="rId13"/>
-      <p:bold r:id="rId14"/>
-      <p:italic r:id="rId15"/>
-      <p:boldItalic r:id="rId16"/>
+      <p:regular r:id="rId14"/>
+      <p:bold r:id="rId15"/>
+      <p:italic r:id="rId16"/>
+      <p:boldItalic r:id="rId17"/>
     </p:embeddedFont>
   </p:embeddedFontLst>
   <p:defaultTextStyle>
@@ -272,7 +273,7 @@
       <p15:notesGuideLst xmlns:p15="http://schemas.microsoft.com/office/powerpoint/2012/main"/>
     </p:ext>
     <p:ext uri="http://customooxmlschemas.google.com/">
-      <go:slidesCustomData xmlns="" xmlns:mc="http://schemas.openxmlformats.org/markup-compatibility/2006" xmlns:mv="urn:schemas-microsoft-com:mac:vml" xmlns:c="http://schemas.openxmlformats.org/drawingml/2006/chart" xmlns:dgm="http://schemas.openxmlformats.org/drawingml/2006/diagram" xmlns:o="urn:schemas-microsoft-com:office:office" xmlns:v="urn:schemas-microsoft-com:vml" xmlns:pvml="urn:schemas-microsoft-com:office:powerpoint" xmlns:com="http://schemas.openxmlformats.org/drawingml/2006/compatibility" xmlns:p14="http://schemas.microsoft.com/office/powerpoint/2010/main" xmlns:p15="http://schemas.microsoft.com/office/powerpoint/2012/main" xmlns:go="http://customooxmlschemas.google.com/" r:id="rId35" roundtripDataSignature="AMtx7mimOCpnQJ84MYBUJaHW+OWe9mD3rQ=="/>
+      <go:slidesCustomData xmlns:go="http://customooxmlschemas.google.com/" xmlns:p15="http://schemas.microsoft.com/office/powerpoint/2012/main" xmlns:p14="http://schemas.microsoft.com/office/powerpoint/2010/main" xmlns:com="http://schemas.openxmlformats.org/drawingml/2006/compatibility" xmlns:pvml="urn:schemas-microsoft-com:office:powerpoint" xmlns:v="urn:schemas-microsoft-com:vml" xmlns:o="urn:schemas-microsoft-com:office:office" xmlns:dgm="http://schemas.openxmlformats.org/drawingml/2006/diagram" xmlns:c="http://schemas.openxmlformats.org/drawingml/2006/chart" xmlns:mv="urn:schemas-microsoft-com:mac:vml" xmlns:mc="http://schemas.openxmlformats.org/markup-compatibility/2006" xmlns="" r:id="rId35" roundtripDataSignature="AMtx7mimOCpnQJ84MYBUJaHW+OWe9mD3rQ=="/>
     </p:ext>
   </p:extLst>
 </p:presentation>
@@ -372,7 +373,7 @@
           <a:p>
             <a:fld id="{03B19FF4-C36C-004A-83D5-CF2B8C3AC93D}" type="datetimeFigureOut">
               <a:rPr lang="en-US" smtClean="0"/>
-              <a:t>1/24/20</a:t>
+              <a:t>1/26/2020</a:t>
             </a:fld>
             <a:endParaRPr lang="en-US"/>
           </a:p>
@@ -2159,7 +2160,7 @@
                 <a:cs typeface="Calibri"/>
                 <a:sym typeface="Calibri"/>
               </a:rPr>
-              <a:t>3</a:t>
+              <a:t>4</a:t>
             </a:fld>
             <a:endParaRPr lang="en-US" sz="1200" b="0" i="0" u="none" strike="noStrike" cap="none">
               <a:solidFill>
@@ -6182,6 +6183,190 @@
           <p:cNvPr id="2" name="Title 1">
             <a:extLst>
               <a:ext uri="{FF2B5EF4-FFF2-40B4-BE49-F238E27FC236}">
+                <a16:creationId xmlns:a16="http://schemas.microsoft.com/office/drawing/2014/main" id="{4B2DAA47-E7A2-4109-80C7-AFAE019517BE}"/>
+              </a:ext>
+            </a:extLst>
+          </p:cNvPr>
+          <p:cNvSpPr>
+            <a:spLocks noGrp="1"/>
+          </p:cNvSpPr>
+          <p:nvPr>
+            <p:ph type="title"/>
+          </p:nvPr>
+        </p:nvSpPr>
+        <p:spPr/>
+        <p:txBody>
+          <a:bodyPr/>
+          <a:lstStyle/>
+          <a:p>
+            <a:pPr algn="ctr"/>
+            <a:r>
+              <a:rPr lang="en-CA" dirty="0"/>
+              <a:t>Predict Assets at Risk from Wildfires</a:t>
+            </a:r>
+          </a:p>
+        </p:txBody>
+      </p:sp>
+      <p:sp>
+        <p:nvSpPr>
+          <p:cNvPr id="3" name="Text Placeholder 2">
+            <a:extLst>
+              <a:ext uri="{FF2B5EF4-FFF2-40B4-BE49-F238E27FC236}">
+                <a16:creationId xmlns:a16="http://schemas.microsoft.com/office/drawing/2014/main" id="{55FA8113-CEC4-468F-BB45-9E0FCFD4B89A}"/>
+              </a:ext>
+            </a:extLst>
+          </p:cNvPr>
+          <p:cNvSpPr>
+            <a:spLocks noGrp="1"/>
+          </p:cNvSpPr>
+          <p:nvPr>
+            <p:ph type="body" idx="1"/>
+          </p:nvPr>
+        </p:nvSpPr>
+        <p:spPr>
+          <a:xfrm>
+            <a:off x="628649" y="1478572"/>
+            <a:ext cx="8215313" cy="5234965"/>
+          </a:xfrm>
+        </p:spPr>
+        <p:txBody>
+          <a:bodyPr>
+            <a:normAutofit lnSpcReduction="10000"/>
+          </a:bodyPr>
+          <a:lstStyle/>
+          <a:p>
+            <a:r>
+              <a:rPr lang="en-CA" dirty="0"/>
+              <a:t>Using global data on past fires:</a:t>
+            </a:r>
+          </a:p>
+          <a:p>
+            <a:pPr lvl="1"/>
+            <a:r>
+              <a:rPr lang="en-CA" dirty="0"/>
+              <a:t>Ignition point</a:t>
+            </a:r>
+          </a:p>
+          <a:p>
+            <a:pPr lvl="1"/>
+            <a:r>
+              <a:rPr lang="en-CA" dirty="0"/>
+              <a:t>Start and end dates</a:t>
+            </a:r>
+          </a:p>
+          <a:p>
+            <a:pPr lvl="1"/>
+            <a:r>
+              <a:rPr lang="en-CA" dirty="0"/>
+              <a:t>Weather conditions (%RH/Temp/Wind/rain)</a:t>
+            </a:r>
+          </a:p>
+          <a:p>
+            <a:pPr lvl="1"/>
+            <a:r>
+              <a:rPr lang="en-CA" dirty="0"/>
+              <a:t>FWI (if available or calculate-able)</a:t>
+            </a:r>
+          </a:p>
+          <a:p>
+            <a:r>
+              <a:rPr lang="en-CA" dirty="0"/>
+              <a:t>Predict Burned area size and geolocation</a:t>
+            </a:r>
+          </a:p>
+          <a:p>
+            <a:r>
+              <a:rPr lang="en-CA" dirty="0"/>
+              <a:t>Overlay asset geolocations (transmission towers, buildings, gas plants)</a:t>
+            </a:r>
+          </a:p>
+          <a:p>
+            <a:r>
+              <a:rPr lang="en-CA" dirty="0"/>
+              <a:t>Provide early warning of more exact at-risk locations (vs. current practice).</a:t>
+            </a:r>
+          </a:p>
+          <a:p>
+            <a:r>
+              <a:rPr lang="en-CA" dirty="0"/>
+              <a:t>Determine possible warning period and indicate probability of burn</a:t>
+            </a:r>
+          </a:p>
+        </p:txBody>
+      </p:sp>
+      <p:sp>
+        <p:nvSpPr>
+          <p:cNvPr id="4" name="Slide Number Placeholder 3">
+            <a:extLst>
+              <a:ext uri="{FF2B5EF4-FFF2-40B4-BE49-F238E27FC236}">
+                <a16:creationId xmlns:a16="http://schemas.microsoft.com/office/drawing/2014/main" id="{A055D43E-D63D-4F74-8C5E-14336F75E5FA}"/>
+              </a:ext>
+            </a:extLst>
+          </p:cNvPr>
+          <p:cNvSpPr>
+            <a:spLocks noGrp="1"/>
+          </p:cNvSpPr>
+          <p:nvPr>
+            <p:ph type="sldNum" idx="12"/>
+          </p:nvPr>
+        </p:nvSpPr>
+        <p:spPr/>
+        <p:txBody>
+          <a:bodyPr/>
+          <a:lstStyle/>
+          <a:p>
+            <a:pPr marL="0" lvl="0" indent="0" algn="r" rtl="0">
+              <a:spcBef>
+                <a:spcPts val="0"/>
+              </a:spcBef>
+              <a:spcAft>
+                <a:spcPts val="0"/>
+              </a:spcAft>
+              <a:buNone/>
+            </a:pPr>
+            <a:fld id="{00000000-1234-1234-1234-123412341234}" type="slidenum">
+              <a:rPr lang="en-US" smtClean="0"/>
+              <a:t>2</a:t>
+            </a:fld>
+            <a:endParaRPr lang="en-US"/>
+          </a:p>
+        </p:txBody>
+      </p:sp>
+    </p:spTree>
+    <p:extLst>
+      <p:ext uri="{BB962C8B-B14F-4D97-AF65-F5344CB8AC3E}">
+        <p14:creationId xmlns:p14="http://schemas.microsoft.com/office/powerpoint/2010/main" val="358682140"/>
+      </p:ext>
+    </p:extLst>
+  </p:cSld>
+  <p:clrMapOvr>
+    <a:masterClrMapping/>
+  </p:clrMapOvr>
+</p:sld>
+</file>
+
+<file path=ppt/slides/slide3.xml><?xml version="1.0" encoding="utf-8"?>
+<p:sld xmlns:a="http://schemas.openxmlformats.org/drawingml/2006/main" xmlns:r="http://schemas.openxmlformats.org/officeDocument/2006/relationships" xmlns:p="http://schemas.openxmlformats.org/presentationml/2006/main">
+  <p:cSld>
+    <p:spTree>
+      <p:nvGrpSpPr>
+        <p:cNvPr id="1" name=""/>
+        <p:cNvGrpSpPr/>
+        <p:nvPr/>
+      </p:nvGrpSpPr>
+      <p:grpSpPr>
+        <a:xfrm>
+          <a:off x="0" y="0"/>
+          <a:ext cx="0" cy="0"/>
+          <a:chOff x="0" y="0"/>
+          <a:chExt cx="0" cy="0"/>
+        </a:xfrm>
+      </p:grpSpPr>
+      <p:sp>
+        <p:nvSpPr>
+          <p:cNvPr id="2" name="Title 1">
+            <a:extLst>
+              <a:ext uri="{FF2B5EF4-FFF2-40B4-BE49-F238E27FC236}">
                 <a16:creationId xmlns:a16="http://schemas.microsoft.com/office/drawing/2014/main" id="{B7B93991-4328-BB4C-BC6D-18ABF531A399}"/>
               </a:ext>
             </a:extLst>
@@ -6237,7 +6422,7 @@
             </a:pPr>
             <a:fld id="{00000000-1234-1234-1234-123412341234}" type="slidenum">
               <a:rPr lang="en-US" smtClean="0"/>
-              <a:t>2</a:t>
+              <a:t>3</a:t>
             </a:fld>
             <a:endParaRPr lang="en-US"/>
           </a:p>
@@ -6257,7 +6442,105 @@
         </p:nvSpPr>
         <p:spPr>
           <a:xfrm>
-            <a:off x="729006" y="2044638"/>
+            <a:off x="648680" y="2687894"/>
+            <a:ext cx="1643766" cy="724829"/>
+          </a:xfrm>
+          <a:prstGeom prst="parallelogram">
+            <a:avLst/>
+          </a:prstGeom>
+        </p:spPr>
+        <p:style>
+          <a:lnRef idx="2">
+            <a:schemeClr val="accent1">
+              <a:shade val="50000"/>
+            </a:schemeClr>
+          </a:lnRef>
+          <a:fillRef idx="1">
+            <a:schemeClr val="accent1"/>
+          </a:fillRef>
+          <a:effectRef idx="0">
+            <a:schemeClr val="accent1"/>
+          </a:effectRef>
+          <a:fontRef idx="minor">
+            <a:schemeClr val="lt1"/>
+          </a:fontRef>
+        </p:style>
+        <p:txBody>
+          <a:bodyPr rtlCol="0" anchor="ctr"/>
+          <a:lstStyle/>
+          <a:p>
+            <a:pPr algn="ctr"/>
+            <a:r>
+              <a:rPr lang="en-US" dirty="0"/>
+              <a:t>Fire Ignition Location (Lat, Long)</a:t>
+            </a:r>
+          </a:p>
+        </p:txBody>
+      </p:sp>
+      <p:sp>
+        <p:nvSpPr>
+          <p:cNvPr id="9" name="Rounded Rectangle 8">
+            <a:extLst>
+              <a:ext uri="{FF2B5EF4-FFF2-40B4-BE49-F238E27FC236}">
+                <a16:creationId xmlns:a16="http://schemas.microsoft.com/office/drawing/2014/main" id="{F9BD2471-A741-A147-B30A-BF5AA29F9E36}"/>
+              </a:ext>
+            </a:extLst>
+          </p:cNvPr>
+          <p:cNvSpPr/>
+          <p:nvPr/>
+        </p:nvSpPr>
+        <p:spPr>
+          <a:xfrm>
+            <a:off x="3677423" y="2407053"/>
+            <a:ext cx="1326995" cy="724829"/>
+          </a:xfrm>
+          <a:prstGeom prst="roundRect">
+            <a:avLst/>
+          </a:prstGeom>
+        </p:spPr>
+        <p:style>
+          <a:lnRef idx="2">
+            <a:schemeClr val="accent1">
+              <a:shade val="50000"/>
+            </a:schemeClr>
+          </a:lnRef>
+          <a:fillRef idx="1">
+            <a:schemeClr val="accent1"/>
+          </a:fillRef>
+          <a:effectRef idx="0">
+            <a:schemeClr val="accent1"/>
+          </a:effectRef>
+          <a:fontRef idx="minor">
+            <a:schemeClr val="lt1"/>
+          </a:fontRef>
+        </p:style>
+        <p:txBody>
+          <a:bodyPr rtlCol="0" anchor="ctr"/>
+          <a:lstStyle/>
+          <a:p>
+            <a:pPr algn="ctr"/>
+            <a:r>
+              <a:rPr lang="en-US" dirty="0"/>
+              <a:t>Prediction Tool (predict burned area)</a:t>
+            </a:r>
+          </a:p>
+        </p:txBody>
+      </p:sp>
+      <p:sp>
+        <p:nvSpPr>
+          <p:cNvPr id="10" name="Parallelogram 9">
+            <a:extLst>
+              <a:ext uri="{FF2B5EF4-FFF2-40B4-BE49-F238E27FC236}">
+                <a16:creationId xmlns:a16="http://schemas.microsoft.com/office/drawing/2014/main" id="{B69D0C0F-7927-3D4B-AE4B-43479D3A7260}"/>
+              </a:ext>
+            </a:extLst>
+          </p:cNvPr>
+          <p:cNvSpPr/>
+          <p:nvPr/>
+        </p:nvSpPr>
+        <p:spPr>
+          <a:xfrm>
+            <a:off x="3599364" y="3992215"/>
             <a:ext cx="1483112" cy="724829"/>
           </a:xfrm>
           <a:prstGeom prst="parallelogram">
@@ -6287,105 +6570,7 @@
             <a:pPr algn="ctr"/>
             <a:r>
               <a:rPr lang="en-US" dirty="0"/>
-              <a:t>Fire Location (Lat, Long)</a:t>
-            </a:r>
-          </a:p>
-        </p:txBody>
-      </p:sp>
-      <p:sp>
-        <p:nvSpPr>
-          <p:cNvPr id="9" name="Rounded Rectangle 8">
-            <a:extLst>
-              <a:ext uri="{FF2B5EF4-FFF2-40B4-BE49-F238E27FC236}">
-                <a16:creationId xmlns:a16="http://schemas.microsoft.com/office/drawing/2014/main" id="{F9BD2471-A741-A147-B30A-BF5AA29F9E36}"/>
-              </a:ext>
-            </a:extLst>
-          </p:cNvPr>
-          <p:cNvSpPr/>
-          <p:nvPr/>
-        </p:nvSpPr>
-        <p:spPr>
-          <a:xfrm>
-            <a:off x="3114328" y="2044638"/>
-            <a:ext cx="1326995" cy="724829"/>
-          </a:xfrm>
-          <a:prstGeom prst="roundRect">
-            <a:avLst/>
-          </a:prstGeom>
-        </p:spPr>
-        <p:style>
-          <a:lnRef idx="2">
-            <a:schemeClr val="accent1">
-              <a:shade val="50000"/>
-            </a:schemeClr>
-          </a:lnRef>
-          <a:fillRef idx="1">
-            <a:schemeClr val="accent1"/>
-          </a:fillRef>
-          <a:effectRef idx="0">
-            <a:schemeClr val="accent1"/>
-          </a:effectRef>
-          <a:fontRef idx="minor">
-            <a:schemeClr val="lt1"/>
-          </a:fontRef>
-        </p:style>
-        <p:txBody>
-          <a:bodyPr rtlCol="0" anchor="ctr"/>
-          <a:lstStyle/>
-          <a:p>
-            <a:pPr algn="ctr"/>
-            <a:r>
-              <a:rPr lang="en-US" dirty="0"/>
-              <a:t>Prediction Tool</a:t>
-            </a:r>
-          </a:p>
-        </p:txBody>
-      </p:sp>
-      <p:sp>
-        <p:nvSpPr>
-          <p:cNvPr id="10" name="Parallelogram 9">
-            <a:extLst>
-              <a:ext uri="{FF2B5EF4-FFF2-40B4-BE49-F238E27FC236}">
-                <a16:creationId xmlns:a16="http://schemas.microsoft.com/office/drawing/2014/main" id="{B69D0C0F-7927-3D4B-AE4B-43479D3A7260}"/>
-              </a:ext>
-            </a:extLst>
-          </p:cNvPr>
-          <p:cNvSpPr/>
-          <p:nvPr/>
-        </p:nvSpPr>
-        <p:spPr>
-          <a:xfrm>
-            <a:off x="3044284" y="4088532"/>
-            <a:ext cx="1483112" cy="724829"/>
-          </a:xfrm>
-          <a:prstGeom prst="parallelogram">
-            <a:avLst/>
-          </a:prstGeom>
-        </p:spPr>
-        <p:style>
-          <a:lnRef idx="2">
-            <a:schemeClr val="accent1">
-              <a:shade val="50000"/>
-            </a:schemeClr>
-          </a:lnRef>
-          <a:fillRef idx="1">
-            <a:schemeClr val="accent1"/>
-          </a:fillRef>
-          <a:effectRef idx="0">
-            <a:schemeClr val="accent1"/>
-          </a:effectRef>
-          <a:fontRef idx="minor">
-            <a:schemeClr val="lt1"/>
-          </a:fontRef>
-        </p:style>
-        <p:txBody>
-          <a:bodyPr rtlCol="0" anchor="ctr"/>
-          <a:lstStyle/>
-          <a:p>
-            <a:pPr algn="ctr"/>
-            <a:r>
-              <a:rPr lang="en-US" dirty="0"/>
-              <a:t>Fire Area Spread</a:t>
+              <a:t>PREDICT: Fire Area Spread</a:t>
             </a:r>
           </a:p>
         </p:txBody>
@@ -6404,7 +6589,7 @@
         </p:nvSpPr>
         <p:spPr>
           <a:xfrm>
-            <a:off x="3044284" y="5577378"/>
+            <a:off x="3508760" y="5607361"/>
             <a:ext cx="1483112" cy="724829"/>
           </a:xfrm>
           <a:prstGeom prst="parallelogram">
@@ -6449,15 +6634,16 @@
             </a:extLst>
           </p:cNvPr>
           <p:cNvCxnSpPr>
+            <a:cxnSpLocks/>
             <a:stCxn id="8" idx="2"/>
             <a:endCxn id="9" idx="1"/>
           </p:cNvCxnSpPr>
           <p:nvPr/>
         </p:nvCxnSpPr>
         <p:spPr>
-          <a:xfrm>
-            <a:off x="2121514" y="2407053"/>
-            <a:ext cx="992814" cy="0"/>
+          <a:xfrm flipV="1">
+            <a:off x="2201842" y="2769468"/>
+            <a:ext cx="1475581" cy="280841"/>
           </a:xfrm>
           <a:prstGeom prst="straightConnector1">
             <a:avLst/>
@@ -6495,7 +6681,7 @@
         </p:nvSpPr>
         <p:spPr>
           <a:xfrm>
-            <a:off x="5241774" y="4813361"/>
+            <a:off x="5519314" y="4813361"/>
             <a:ext cx="1326995" cy="724829"/>
           </a:xfrm>
           <a:prstGeom prst="roundRect">
@@ -6547,8 +6733,8 @@
         </p:nvCxnSpPr>
         <p:spPr>
           <a:xfrm>
-            <a:off x="4436792" y="4450947"/>
-            <a:ext cx="804982" cy="724829"/>
+            <a:off x="4991872" y="4354630"/>
+            <a:ext cx="527442" cy="821146"/>
           </a:xfrm>
           <a:prstGeom prst="straightConnector1">
             <a:avLst/>
@@ -6589,8 +6775,8 @@
         </p:nvCxnSpPr>
         <p:spPr>
           <a:xfrm flipV="1">
-            <a:off x="4436792" y="5175776"/>
-            <a:ext cx="804982" cy="764017"/>
+            <a:off x="4901268" y="5175776"/>
+            <a:ext cx="618046" cy="794000"/>
           </a:xfrm>
           <a:prstGeom prst="straightConnector1">
             <a:avLst/>
@@ -6729,8 +6915,8 @@
         </p:nvCxnSpPr>
         <p:spPr>
           <a:xfrm flipV="1">
-            <a:off x="6568769" y="4450947"/>
-            <a:ext cx="714378" cy="724829"/>
+            <a:off x="6846309" y="4450947"/>
+            <a:ext cx="436838" cy="724829"/>
           </a:xfrm>
           <a:prstGeom prst="straightConnector1">
             <a:avLst/>
@@ -6771,8 +6957,8 @@
         </p:nvCxnSpPr>
         <p:spPr>
           <a:xfrm>
-            <a:off x="6568769" y="5175776"/>
-            <a:ext cx="714378" cy="766766"/>
+            <a:off x="6846309" y="5175776"/>
+            <a:ext cx="436838" cy="766766"/>
           </a:xfrm>
           <a:prstGeom prst="straightConnector1">
             <a:avLst/>
@@ -6810,7 +6996,7 @@
         </p:nvSpPr>
         <p:spPr>
           <a:xfrm>
-            <a:off x="5619873" y="1149928"/>
+            <a:off x="3677423" y="1092203"/>
             <a:ext cx="1326995" cy="724829"/>
           </a:xfrm>
           <a:prstGeom prst="roundRect">
@@ -6859,7 +7045,7 @@
         </p:nvSpPr>
         <p:spPr>
           <a:xfrm>
-            <a:off x="5619872" y="2942239"/>
+            <a:off x="6182811" y="1073288"/>
             <a:ext cx="1326995" cy="724829"/>
           </a:xfrm>
           <a:prstGeom prst="roundRect">
@@ -6894,55 +7080,6 @@
           </a:p>
         </p:txBody>
       </p:sp>
-      <p:sp>
-        <p:nvSpPr>
-          <p:cNvPr id="28" name="Rounded Rectangle 27">
-            <a:extLst>
-              <a:ext uri="{FF2B5EF4-FFF2-40B4-BE49-F238E27FC236}">
-                <a16:creationId xmlns:a16="http://schemas.microsoft.com/office/drawing/2014/main" id="{61550711-4B36-EC46-AD68-4AF0EAC8B626}"/>
-              </a:ext>
-            </a:extLst>
-          </p:cNvPr>
-          <p:cNvSpPr/>
-          <p:nvPr/>
-        </p:nvSpPr>
-        <p:spPr>
-          <a:xfrm>
-            <a:off x="5619872" y="2046083"/>
-            <a:ext cx="1326995" cy="724829"/>
-          </a:xfrm>
-          <a:prstGeom prst="roundRect">
-            <a:avLst/>
-          </a:prstGeom>
-        </p:spPr>
-        <p:style>
-          <a:lnRef idx="2">
-            <a:schemeClr val="accent1">
-              <a:shade val="50000"/>
-            </a:schemeClr>
-          </a:lnRef>
-          <a:fillRef idx="1">
-            <a:schemeClr val="accent1"/>
-          </a:fillRef>
-          <a:effectRef idx="0">
-            <a:schemeClr val="accent1"/>
-          </a:effectRef>
-          <a:fontRef idx="minor">
-            <a:schemeClr val="lt1"/>
-          </a:fontRef>
-        </p:style>
-        <p:txBody>
-          <a:bodyPr rtlCol="0" anchor="ctr"/>
-          <a:lstStyle/>
-          <a:p>
-            <a:pPr algn="ctr"/>
-            <a:r>
-              <a:rPr lang="en-US" dirty="0"/>
-              <a:t>Collect Weather Data</a:t>
-            </a:r>
-          </a:p>
-        </p:txBody>
-      </p:sp>
       <p:cxnSp>
         <p:nvCxnSpPr>
           <p:cNvPr id="48" name="Straight Arrow Connector 47">
@@ -6953,22 +7090,23 @@
             </a:extLst>
           </p:cNvPr>
           <p:cNvCxnSpPr>
-            <a:stCxn id="9" idx="3"/>
-            <a:endCxn id="21" idx="1"/>
+            <a:cxnSpLocks/>
+            <a:stCxn id="9" idx="0"/>
+            <a:endCxn id="21" idx="2"/>
           </p:cNvCxnSpPr>
           <p:nvPr/>
         </p:nvCxnSpPr>
         <p:spPr>
           <a:xfrm flipV="1">
-            <a:off x="4441323" y="1512343"/>
-            <a:ext cx="1178550" cy="894710"/>
+            <a:off x="4340921" y="1817032"/>
+            <a:ext cx="0" cy="590021"/>
           </a:xfrm>
           <a:prstGeom prst="straightConnector1">
             <a:avLst/>
           </a:prstGeom>
           <a:ln>
             <a:headEnd type="triangle"/>
-            <a:tailEnd type="triangle"/>
+            <a:tailEnd type="none"/>
           </a:ln>
         </p:spPr>
         <p:style>
@@ -6996,22 +7134,23 @@
             </a:extLst>
           </p:cNvPr>
           <p:cNvCxnSpPr>
-            <a:stCxn id="9" idx="3"/>
-            <a:endCxn id="28" idx="1"/>
+            <a:cxnSpLocks/>
+            <a:stCxn id="9" idx="1"/>
+            <a:endCxn id="16" idx="2"/>
           </p:cNvCxnSpPr>
           <p:nvPr/>
         </p:nvCxnSpPr>
         <p:spPr>
-          <a:xfrm>
-            <a:off x="4441323" y="2407053"/>
-            <a:ext cx="1178549" cy="1445"/>
+          <a:xfrm flipH="1" flipV="1">
+            <a:off x="2202147" y="1798687"/>
+            <a:ext cx="1475276" cy="970781"/>
           </a:xfrm>
           <a:prstGeom prst="straightConnector1">
             <a:avLst/>
           </a:prstGeom>
           <a:ln>
             <a:headEnd type="triangle"/>
-            <a:tailEnd type="triangle"/>
+            <a:tailEnd type="none"/>
           </a:ln>
         </p:spPr>
         <p:style>
@@ -7045,16 +7184,16 @@
           <p:nvPr/>
         </p:nvCxnSpPr>
         <p:spPr>
-          <a:xfrm>
-            <a:off x="4441323" y="2407053"/>
-            <a:ext cx="1178549" cy="897601"/>
+          <a:xfrm flipV="1">
+            <a:off x="5004418" y="1435703"/>
+            <a:ext cx="1178393" cy="1333765"/>
           </a:xfrm>
           <a:prstGeom prst="straightConnector1">
             <a:avLst/>
           </a:prstGeom>
           <a:ln>
             <a:headEnd type="triangle"/>
-            <a:tailEnd type="triangle"/>
+            <a:tailEnd type="none"/>
           </a:ln>
         </p:spPr>
         <p:style>
@@ -7088,9 +7227,142 @@
           <p:nvPr/>
         </p:nvCxnSpPr>
         <p:spPr>
+          <a:xfrm flipH="1">
+            <a:off x="4340920" y="3131882"/>
+            <a:ext cx="1" cy="860333"/>
+          </a:xfrm>
+          <a:prstGeom prst="straightConnector1">
+            <a:avLst/>
+          </a:prstGeom>
+          <a:ln>
+            <a:tailEnd type="triangle"/>
+          </a:ln>
+        </p:spPr>
+        <p:style>
+          <a:lnRef idx="1">
+            <a:schemeClr val="accent1"/>
+          </a:lnRef>
+          <a:fillRef idx="0">
+            <a:schemeClr val="accent1"/>
+          </a:fillRef>
+          <a:effectRef idx="0">
+            <a:schemeClr val="accent1"/>
+          </a:effectRef>
+          <a:fontRef idx="minor">
+            <a:schemeClr val="tx1"/>
+          </a:fontRef>
+        </p:style>
+      </p:cxnSp>
+      <p:sp>
+        <p:nvSpPr>
+          <p:cNvPr id="16" name="Parallelogram 15">
+            <a:extLst>
+              <a:ext uri="{FF2B5EF4-FFF2-40B4-BE49-F238E27FC236}">
+                <a16:creationId xmlns:a16="http://schemas.microsoft.com/office/drawing/2014/main" id="{D16E1938-B9EC-4ABD-88B3-2BA1A9A921AF}"/>
+              </a:ext>
+            </a:extLst>
+          </p:cNvPr>
+          <p:cNvSpPr/>
+          <p:nvPr/>
+        </p:nvSpPr>
+        <p:spPr>
           <a:xfrm>
-            <a:off x="3777826" y="2769467"/>
-            <a:ext cx="8014" cy="1319065"/>
+            <a:off x="658621" y="1437490"/>
+            <a:ext cx="1633825" cy="722394"/>
+          </a:xfrm>
+          <a:prstGeom prst="parallelogram">
+            <a:avLst/>
+          </a:prstGeom>
+        </p:spPr>
+        <p:style>
+          <a:lnRef idx="2">
+            <a:schemeClr val="accent1">
+              <a:shade val="50000"/>
+            </a:schemeClr>
+          </a:lnRef>
+          <a:fillRef idx="1">
+            <a:schemeClr val="accent1"/>
+          </a:fillRef>
+          <a:effectRef idx="0">
+            <a:schemeClr val="accent1"/>
+          </a:effectRef>
+          <a:fontRef idx="minor">
+            <a:schemeClr val="lt1"/>
+          </a:fontRef>
+        </p:style>
+        <p:txBody>
+          <a:bodyPr rtlCol="0" anchor="ctr"/>
+          <a:lstStyle/>
+          <a:p>
+            <a:pPr algn="ctr"/>
+            <a:r>
+              <a:rPr lang="en-CA" dirty="0"/>
+              <a:t>Weather Data for Location</a:t>
+            </a:r>
+          </a:p>
+        </p:txBody>
+      </p:sp>
+      <p:cxnSp>
+        <p:nvCxnSpPr>
+          <p:cNvPr id="37" name="Straight Arrow Connector 36">
+            <a:extLst>
+              <a:ext uri="{FF2B5EF4-FFF2-40B4-BE49-F238E27FC236}">
+                <a16:creationId xmlns:a16="http://schemas.microsoft.com/office/drawing/2014/main" id="{70907491-E83F-4F9E-AE88-16472C78963E}"/>
+              </a:ext>
+            </a:extLst>
+          </p:cNvPr>
+          <p:cNvCxnSpPr>
+            <a:stCxn id="16" idx="2"/>
+            <a:endCxn id="21" idx="1"/>
+          </p:cNvCxnSpPr>
+          <p:nvPr/>
+        </p:nvCxnSpPr>
+        <p:spPr>
+          <a:xfrm flipV="1">
+            <a:off x="2202147" y="1454618"/>
+            <a:ext cx="1475276" cy="344069"/>
+          </a:xfrm>
+          <a:prstGeom prst="straightConnector1">
+            <a:avLst/>
+          </a:prstGeom>
+          <a:ln>
+            <a:tailEnd type="triangle"/>
+          </a:ln>
+        </p:spPr>
+        <p:style>
+          <a:lnRef idx="1">
+            <a:schemeClr val="accent1"/>
+          </a:lnRef>
+          <a:fillRef idx="0">
+            <a:schemeClr val="accent1"/>
+          </a:fillRef>
+          <a:effectRef idx="0">
+            <a:schemeClr val="accent1"/>
+          </a:effectRef>
+          <a:fontRef idx="minor">
+            <a:schemeClr val="tx1"/>
+          </a:fontRef>
+        </p:style>
+      </p:cxnSp>
+      <p:cxnSp>
+        <p:nvCxnSpPr>
+          <p:cNvPr id="55" name="Straight Arrow Connector 54">
+            <a:extLst>
+              <a:ext uri="{FF2B5EF4-FFF2-40B4-BE49-F238E27FC236}">
+                <a16:creationId xmlns:a16="http://schemas.microsoft.com/office/drawing/2014/main" id="{6009594B-27D1-4129-84B1-5B779DC8ED4E}"/>
+              </a:ext>
+            </a:extLst>
+          </p:cNvPr>
+          <p:cNvCxnSpPr>
+            <a:stCxn id="27" idx="1"/>
+            <a:endCxn id="21" idx="3"/>
+          </p:cNvCxnSpPr>
+          <p:nvPr/>
+        </p:nvCxnSpPr>
+        <p:spPr>
+          <a:xfrm flipH="1">
+            <a:off x="5004418" y="1435703"/>
+            <a:ext cx="1178393" cy="18915"/>
           </a:xfrm>
           <a:prstGeom prst="straightConnector1">
             <a:avLst/>
@@ -7127,7 +7399,7 @@
 </p:sld>
 </file>
 
-<file path=ppt/slides/slide3.xml><?xml version="1.0" encoding="utf-8"?>
+<file path=ppt/slides/slide4.xml><?xml version="1.0" encoding="utf-8"?>
 <p:sld xmlns:a="http://schemas.openxmlformats.org/drawingml/2006/main" xmlns:r="http://schemas.openxmlformats.org/officeDocument/2006/relationships" xmlns:p="http://schemas.openxmlformats.org/presentationml/2006/main">
   <p:cSld>
     <p:spTree>
@@ -7162,12 +7434,22 @@
         </p:nvSpPr>
         <p:spPr/>
         <p:txBody>
-          <a:bodyPr/>
+          <a:bodyPr>
+            <a:normAutofit/>
+          </a:bodyPr>
           <a:lstStyle/>
           <a:p>
             <a:r>
-              <a:rPr lang="en-US" dirty="0"/>
-              <a:t>Correlations …</a:t>
+              <a:rPr lang="en-US" sz="3600" dirty="0"/>
+              <a:t>Correlations: </a:t>
+            </a:r>
+            <a:r>
+              <a:rPr lang="en-US" sz="3600" dirty="0" err="1"/>
+              <a:t>Montesinho</a:t>
+            </a:r>
+            <a:r>
+              <a:rPr lang="en-US" sz="3600" dirty="0"/>
+              <a:t> Data</a:t>
             </a:r>
           </a:p>
         </p:txBody>
@@ -7204,7 +7486,7 @@
             </a:pPr>
             <a:fld id="{00000000-1234-1234-1234-123412341234}" type="slidenum">
               <a:rPr lang="en-US" smtClean="0"/>
-              <a:t>3</a:t>
+              <a:t>4</a:t>
             </a:fld>
             <a:endParaRPr lang="en-US"/>
           </a:p>
@@ -7253,7 +7535,7 @@
 </p:sld>
 </file>
 
-<file path=ppt/slides/slide4.xml><?xml version="1.0" encoding="utf-8"?>
+<file path=ppt/slides/slide5.xml><?xml version="1.0" encoding="utf-8"?>
 <p:sld xmlns:a="http://schemas.openxmlformats.org/drawingml/2006/main" xmlns:r="http://schemas.openxmlformats.org/officeDocument/2006/relationships" xmlns:p="http://schemas.openxmlformats.org/presentationml/2006/main">
   <p:cSld>
     <p:spTree>
@@ -7270,6 +7552,35 @@
           <a:chExt cx="0" cy="0"/>
         </a:xfrm>
       </p:grpSpPr>
+      <p:pic>
+        <p:nvPicPr>
+          <p:cNvPr id="7" name="Picture 6" descr="A picture containing text, table, sitting, white&#10;&#10;Description automatically generated">
+            <a:extLst>
+              <a:ext uri="{FF2B5EF4-FFF2-40B4-BE49-F238E27FC236}">
+                <a16:creationId xmlns:a16="http://schemas.microsoft.com/office/drawing/2014/main" id="{B44D9467-FDB0-47E1-AFC2-BBA787CAEF0B}"/>
+              </a:ext>
+            </a:extLst>
+          </p:cNvPr>
+          <p:cNvPicPr>
+            <a:picLocks noChangeAspect="1"/>
+          </p:cNvPicPr>
+          <p:nvPr/>
+        </p:nvPicPr>
+        <p:blipFill rotWithShape="1">
+          <a:blip r:embed="rId2"/>
+          <a:srcRect l="8346" t="6963" r="6006" b="7970"/>
+          <a:stretch/>
+        </p:blipFill>
+        <p:spPr>
+          <a:xfrm>
+            <a:off x="838381" y="2543908"/>
+            <a:ext cx="7676970" cy="3812443"/>
+          </a:xfrm>
+          <a:prstGeom prst="rect">
+            <a:avLst/>
+          </a:prstGeom>
+        </p:spPr>
+      </p:pic>
       <p:sp>
         <p:nvSpPr>
           <p:cNvPr id="2" name="Title 1">
@@ -7358,42 +7669,12 @@
             </a:pPr>
             <a:fld id="{00000000-1234-1234-1234-123412341234}" type="slidenum">
               <a:rPr lang="en-US" smtClean="0"/>
-              <a:t>4</a:t>
+              <a:t>5</a:t>
             </a:fld>
             <a:endParaRPr lang="en-US"/>
           </a:p>
         </p:txBody>
       </p:sp>
-      <p:pic>
-        <p:nvPicPr>
-          <p:cNvPr id="5" name="Picture 4">
-            <a:extLst>
-              <a:ext uri="{FF2B5EF4-FFF2-40B4-BE49-F238E27FC236}">
-                <a16:creationId xmlns:a16="http://schemas.microsoft.com/office/drawing/2014/main" id="{2F1E5C04-E3FB-6049-A9E9-880F3811754A}"/>
-              </a:ext>
-            </a:extLst>
-          </p:cNvPr>
-          <p:cNvPicPr>
-            <a:picLocks noChangeAspect="1"/>
-          </p:cNvPicPr>
-          <p:nvPr/>
-        </p:nvPicPr>
-        <p:blipFill>
-          <a:blip r:embed="rId2"/>
-          <a:stretch>
-            <a:fillRect/>
-          </a:stretch>
-        </p:blipFill>
-        <p:spPr>
-          <a:xfrm>
-            <a:off x="2165350" y="2502829"/>
-            <a:ext cx="4813300" cy="3302000"/>
-          </a:xfrm>
-          <a:prstGeom prst="rect">
-            <a:avLst/>
-          </a:prstGeom>
-        </p:spPr>
-      </p:pic>
     </p:spTree>
     <p:extLst>
       <p:ext uri="{BB962C8B-B14F-4D97-AF65-F5344CB8AC3E}">
@@ -7407,7 +7688,7 @@
 </p:sld>
 </file>
 
-<file path=ppt/slides/slide5.xml><?xml version="1.0" encoding="utf-8"?>
+<file path=ppt/slides/slide6.xml><?xml version="1.0" encoding="utf-8"?>
 <p:sld xmlns:a="http://schemas.openxmlformats.org/drawingml/2006/main" xmlns:r="http://schemas.openxmlformats.org/officeDocument/2006/relationships" xmlns:p="http://schemas.openxmlformats.org/presentationml/2006/main">
   <p:cSld>
     <p:spTree>
@@ -7531,7 +7812,7 @@
             </a:pPr>
             <a:fld id="{00000000-1234-1234-1234-123412341234}" type="slidenum">
               <a:rPr lang="en-US" smtClean="0"/>
-              <a:t>5</a:t>
+              <a:t>6</a:t>
             </a:fld>
             <a:endParaRPr lang="en-US"/>
           </a:p>

</xml_diff>